<commit_message>
edit: Lab 7 file and modify all powerpoint titles
</commit_message>
<xml_diff>
--- a/Lab/12-Struct/C-Lab-Struct.pptx
+++ b/Lab/12-Struct/C-Lab-Struct.pptx
@@ -34,45 +34,45 @@
   <p:notesSz cx="6858000" cy="9144000"/>
   <p:embeddedFontLst>
     <p:embeddedFont>
+      <p:font typeface="Bree Serif" panose="020B0604020202020204" charset="0"/>
+      <p:regular r:id="rId22"/>
+    </p:embeddedFont>
+    <p:embeddedFont>
+      <p:font typeface="Didact Gothic" panose="020B0604020202020204" charset="0"/>
+      <p:regular r:id="rId23"/>
+    </p:embeddedFont>
+    <p:embeddedFont>
+      <p:font typeface="Dana" panose="020B0604020202020204" charset="-78"/>
+      <p:regular r:id="rId24"/>
+      <p:bold r:id="rId25"/>
+      <p:italic r:id="rId26"/>
+      <p:boldItalic r:id="rId27"/>
+    </p:embeddedFont>
+    <p:embeddedFont>
+      <p:font typeface="Roboto Thin" panose="020B0604020202020204" charset="0"/>
+      <p:regular r:id="rId28"/>
+      <p:bold r:id="rId29"/>
+      <p:italic r:id="rId30"/>
+      <p:boldItalic r:id="rId31"/>
+    </p:embeddedFont>
+    <p:embeddedFont>
+      <p:font typeface="Roboto Black" panose="020B0604020202020204" charset="0"/>
+      <p:bold r:id="rId32"/>
+      <p:boldItalic r:id="rId33"/>
+    </p:embeddedFont>
+    <p:embeddedFont>
+      <p:font typeface="Lalezar" panose="00000500000000000000" pitchFamily="2" charset="-78"/>
+      <p:regular r:id="rId34"/>
+    </p:embeddedFont>
+    <p:embeddedFont>
       <p:font typeface="Roboto Light" panose="020B0604020202020204" charset="0"/>
-      <p:regular r:id="rId22"/>
-      <p:bold r:id="rId23"/>
-      <p:italic r:id="rId24"/>
-      <p:boldItalic r:id="rId25"/>
+      <p:regular r:id="rId35"/>
+      <p:bold r:id="rId36"/>
+      <p:italic r:id="rId37"/>
+      <p:boldItalic r:id="rId38"/>
     </p:embeddedFont>
     <p:embeddedFont>
       <p:font typeface="Consolas" panose="020B0609020204030204" pitchFamily="49" charset="0"/>
-      <p:regular r:id="rId26"/>
-      <p:bold r:id="rId27"/>
-      <p:italic r:id="rId28"/>
-      <p:boldItalic r:id="rId29"/>
-    </p:embeddedFont>
-    <p:embeddedFont>
-      <p:font typeface="Didact Gothic" panose="020B0604020202020204" charset="0"/>
-      <p:regular r:id="rId30"/>
-    </p:embeddedFont>
-    <p:embeddedFont>
-      <p:font typeface="Roboto Thin" panose="020B0604020202020204" charset="0"/>
-      <p:regular r:id="rId31"/>
-      <p:bold r:id="rId32"/>
-      <p:italic r:id="rId33"/>
-      <p:boldItalic r:id="rId34"/>
-    </p:embeddedFont>
-    <p:embeddedFont>
-      <p:font typeface="Bree Serif" panose="020B0604020202020204" charset="0"/>
-      <p:regular r:id="rId35"/>
-    </p:embeddedFont>
-    <p:embeddedFont>
-      <p:font typeface="Lalezar" panose="00000500000000000000" pitchFamily="2" charset="-78"/>
-      <p:regular r:id="rId36"/>
-    </p:embeddedFont>
-    <p:embeddedFont>
-      <p:font typeface="Roboto Black" panose="020B0604020202020204" charset="0"/>
-      <p:bold r:id="rId37"/>
-      <p:boldItalic r:id="rId38"/>
-    </p:embeddedFont>
-    <p:embeddedFont>
-      <p:font typeface="Dana" panose="020B0604020202020204" charset="-78"/>
       <p:regular r:id="rId39"/>
       <p:bold r:id="rId40"/>
       <p:italic r:id="rId41"/>
@@ -435,7 +435,7 @@
           <a:p>
             <a:fld id="{51C35479-EBFD-40F3-9978-325B11083506}" type="datetimeFigureOut">
               <a:rPr lang="en-US" smtClean="0"/>
-              <a:t>5/29/2021</a:t>
+              <a:t>11/14/2021</a:t>
             </a:fld>
             <a:endParaRPr lang="en-US"/>
           </a:p>
@@ -31514,17 +31514,7 @@
                 <a:latin typeface="Dana" panose="00000500000000000000" pitchFamily="2" charset="-78"/>
                 <a:cs typeface="Dana" panose="00000500000000000000" pitchFamily="2" charset="-78"/>
               </a:rPr>
-              <a:t>می‌خوایم که قابلیت‌‌های زیر رو داشته باشه</a:t>
-            </a:r>
-            <a:r>
-              <a:rPr lang="fa-IR" sz="1600" dirty="0" smtClean="0">
-                <a:solidFill>
-                  <a:schemeClr val="bg1"/>
-                </a:solidFill>
-                <a:latin typeface="Dana" panose="00000500000000000000" pitchFamily="2" charset="-78"/>
-                <a:cs typeface="Dana" panose="00000500000000000000" pitchFamily="2" charset="-78"/>
-              </a:rPr>
-              <a:t>:</a:t>
+              <a:t>می‌خوایم که قابلیت‌‌های زیر رو داشته باشه:</a:t>
             </a:r>
             <a:r>
               <a:rPr lang="en-US" sz="1600" dirty="0" smtClean="0">
@@ -33675,17 +33665,7 @@
                 <a:latin typeface="Dana" panose="00000500000000000000" pitchFamily="2" charset="-78"/>
                 <a:cs typeface="Dana" panose="00000500000000000000" pitchFamily="2" charset="-78"/>
               </a:rPr>
-              <a:t>و در آخر، قسمت امتیازی‌مون هم این شکلیه که استاد بتونه هر زمان که خواست دانش‌جوهای توی لیست رو به ترتیب فامیلی‌هاشون توی لیست سورت کنه. فقط این رو حواستون باشه که اگه قرار باشه ما توی لیست هی بگردیم دنبال نفر بعدی و وقتی که پیداش کردیم از توی لیست حذف کنیم و به یه لیست دیگه اضافه کنیم که می‌شه صرفا یه مخلوطی از بخشای قبلی =) در نتیجه برای امتیازی شدنش شما باید توی همون یک لیستی که داریم سورت رو انجام بدین</a:t>
-            </a:r>
-            <a:r>
-              <a:rPr lang="fa-IR" sz="1600" dirty="0" smtClean="0">
-                <a:solidFill>
-                  <a:schemeClr val="bg1"/>
-                </a:solidFill>
-                <a:latin typeface="Dana" panose="00000500000000000000" pitchFamily="2" charset="-78"/>
-                <a:cs typeface="Dana" panose="00000500000000000000" pitchFamily="2" charset="-78"/>
-              </a:rPr>
-              <a:t>.</a:t>
+              <a:t>و در آخر، قسمت امتیازی‌مون هم این شکلیه که استاد بتونه هر زمان که خواست دانش‌جوهای توی لیست رو به ترتیب فامیلی‌هاشون توی لیست سورت کنه. فقط این رو حواستون باشه که اگه قرار باشه ما توی لیست هی بگردیم دنبال نفر بعدی و وقتی که پیداش کردیم از توی لیست حذف کنیم و به یه لیست دیگه اضافه کنیم که می‌شه صرفا یه مخلوطی از بخشای قبلی =) در نتیجه برای امتیازی شدنش شما باید توی همون یک لیستی که داریم سورت رو انجام بدین.</a:t>
             </a:r>
             <a:r>
               <a:rPr lang="en-US" sz="1600" smtClean="0">

</xml_diff>